<commit_message>
Analysis for 2 days | Fixed trial duration log |
</commit_message>
<xml_diff>
--- a/experiment/subject_recruitment/מודעות גיוס.pptx
+++ b/experiment/subject_recruitment/מודעות גיוס.pptx
@@ -7,6 +7,7 @@
   <p:sldIdLst>
     <p:sldId id="256" r:id="rId2"/>
     <p:sldId id="257" r:id="rId3"/>
+    <p:sldId id="258" r:id="rId4"/>
   </p:sldIdLst>
   <p:sldSz cx="12192000" cy="6858000"/>
   <p:notesSz cx="6858000" cy="9144000"/>
@@ -262,7 +263,7 @@
           <a:p>
             <a:fld id="{351EEA5B-5A71-4DF3-A5C7-778567C98FB4}" type="datetimeFigureOut">
               <a:rPr lang="he-IL" smtClean="0"/>
-              <a:t>כ"א/אלול/תשפ"א</a:t>
+              <a:t>כ'/תשרי/תשפ"ב</a:t>
             </a:fld>
             <a:endParaRPr lang="he-IL"/>
           </a:p>
@@ -462,7 +463,7 @@
           <a:p>
             <a:fld id="{351EEA5B-5A71-4DF3-A5C7-778567C98FB4}" type="datetimeFigureOut">
               <a:rPr lang="he-IL" smtClean="0"/>
-              <a:t>כ"א/אלול/תשפ"א</a:t>
+              <a:t>כ'/תשרי/תשפ"ב</a:t>
             </a:fld>
             <a:endParaRPr lang="he-IL"/>
           </a:p>
@@ -672,7 +673,7 @@
           <a:p>
             <a:fld id="{351EEA5B-5A71-4DF3-A5C7-778567C98FB4}" type="datetimeFigureOut">
               <a:rPr lang="he-IL" smtClean="0"/>
-              <a:t>כ"א/אלול/תשפ"א</a:t>
+              <a:t>כ'/תשרי/תשפ"ב</a:t>
             </a:fld>
             <a:endParaRPr lang="he-IL"/>
           </a:p>
@@ -872,7 +873,7 @@
           <a:p>
             <a:fld id="{351EEA5B-5A71-4DF3-A5C7-778567C98FB4}" type="datetimeFigureOut">
               <a:rPr lang="he-IL" smtClean="0"/>
-              <a:t>כ"א/אלול/תשפ"א</a:t>
+              <a:t>כ'/תשרי/תשפ"ב</a:t>
             </a:fld>
             <a:endParaRPr lang="he-IL"/>
           </a:p>
@@ -1148,7 +1149,7 @@
           <a:p>
             <a:fld id="{351EEA5B-5A71-4DF3-A5C7-778567C98FB4}" type="datetimeFigureOut">
               <a:rPr lang="he-IL" smtClean="0"/>
-              <a:t>כ"א/אלול/תשפ"א</a:t>
+              <a:t>כ'/תשרי/תשפ"ב</a:t>
             </a:fld>
             <a:endParaRPr lang="he-IL"/>
           </a:p>
@@ -1416,7 +1417,7 @@
           <a:p>
             <a:fld id="{351EEA5B-5A71-4DF3-A5C7-778567C98FB4}" type="datetimeFigureOut">
               <a:rPr lang="he-IL" smtClean="0"/>
-              <a:t>כ"א/אלול/תשפ"א</a:t>
+              <a:t>כ'/תשרי/תשפ"ב</a:t>
             </a:fld>
             <a:endParaRPr lang="he-IL"/>
           </a:p>
@@ -1831,7 +1832,7 @@
           <a:p>
             <a:fld id="{351EEA5B-5A71-4DF3-A5C7-778567C98FB4}" type="datetimeFigureOut">
               <a:rPr lang="he-IL" smtClean="0"/>
-              <a:t>כ"א/אלול/תשפ"א</a:t>
+              <a:t>כ'/תשרי/תשפ"ב</a:t>
             </a:fld>
             <a:endParaRPr lang="he-IL"/>
           </a:p>
@@ -1973,7 +1974,7 @@
           <a:p>
             <a:fld id="{351EEA5B-5A71-4DF3-A5C7-778567C98FB4}" type="datetimeFigureOut">
               <a:rPr lang="he-IL" smtClean="0"/>
-              <a:t>כ"א/אלול/תשפ"א</a:t>
+              <a:t>כ'/תשרי/תשפ"ב</a:t>
             </a:fld>
             <a:endParaRPr lang="he-IL"/>
           </a:p>
@@ -2086,7 +2087,7 @@
           <a:p>
             <a:fld id="{351EEA5B-5A71-4DF3-A5C7-778567C98FB4}" type="datetimeFigureOut">
               <a:rPr lang="he-IL" smtClean="0"/>
-              <a:t>כ"א/אלול/תשפ"א</a:t>
+              <a:t>כ'/תשרי/תשפ"ב</a:t>
             </a:fld>
             <a:endParaRPr lang="he-IL"/>
           </a:p>
@@ -2399,7 +2400,7 @@
           <a:p>
             <a:fld id="{351EEA5B-5A71-4DF3-A5C7-778567C98FB4}" type="datetimeFigureOut">
               <a:rPr lang="he-IL" smtClean="0"/>
-              <a:t>כ"א/אלול/תשפ"א</a:t>
+              <a:t>כ'/תשרי/תשפ"ב</a:t>
             </a:fld>
             <a:endParaRPr lang="he-IL"/>
           </a:p>
@@ -2688,7 +2689,7 @@
           <a:p>
             <a:fld id="{351EEA5B-5A71-4DF3-A5C7-778567C98FB4}" type="datetimeFigureOut">
               <a:rPr lang="he-IL" smtClean="0"/>
-              <a:t>כ"א/אלול/תשפ"א</a:t>
+              <a:t>כ'/תשרי/תשפ"ב</a:t>
             </a:fld>
             <a:endParaRPr lang="he-IL"/>
           </a:p>
@@ -2931,7 +2932,7 @@
           <a:p>
             <a:fld id="{351EEA5B-5A71-4DF3-A5C7-778567C98FB4}" type="datetimeFigureOut">
               <a:rPr lang="he-IL" smtClean="0"/>
-              <a:t>כ"א/אלול/תשפ"א</a:t>
+              <a:t>כ'/תשרי/תשפ"ב</a:t>
             </a:fld>
             <a:endParaRPr lang="he-IL"/>
           </a:p>
@@ -4102,6 +4103,410 @@
 </p:sld>
 </file>
 
+<file path=ppt/slides/slide3.xml><?xml version="1.0" encoding="utf-8"?>
+<p:sld xmlns:a="http://schemas.openxmlformats.org/drawingml/2006/main" xmlns:r="http://schemas.openxmlformats.org/officeDocument/2006/relationships" xmlns:p="http://schemas.openxmlformats.org/presentationml/2006/main">
+  <p:cSld>
+    <p:spTree>
+      <p:nvGrpSpPr>
+        <p:cNvPr id="1" name=""/>
+        <p:cNvGrpSpPr/>
+        <p:nvPr/>
+      </p:nvGrpSpPr>
+      <p:grpSpPr>
+        <a:xfrm>
+          <a:off x="0" y="0"/>
+          <a:ext cx="0" cy="0"/>
+          <a:chOff x="0" y="0"/>
+          <a:chExt cx="0" cy="0"/>
+        </a:xfrm>
+      </p:grpSpPr>
+      <p:pic>
+        <p:nvPicPr>
+          <p:cNvPr id="5" name="Picture 4" descr="A dog looking at a computer&#10;&#10;Description automatically generated with medium confidence">
+            <a:extLst>
+              <a:ext uri="{FF2B5EF4-FFF2-40B4-BE49-F238E27FC236}">
+                <a16:creationId xmlns:a16="http://schemas.microsoft.com/office/drawing/2014/main" id="{787A8A51-6B78-4086-836D-3DE6CB859905}"/>
+              </a:ext>
+            </a:extLst>
+          </p:cNvPr>
+          <p:cNvPicPr>
+            <a:picLocks noChangeAspect="1"/>
+          </p:cNvPicPr>
+          <p:nvPr/>
+        </p:nvPicPr>
+        <p:blipFill>
+          <a:blip r:embed="rId2">
+            <a:extLst>
+              <a:ext uri="{28A0092B-C50C-407E-A947-70E740481C1C}">
+                <a14:useLocalDpi xmlns:a14="http://schemas.microsoft.com/office/drawing/2010/main" val="0"/>
+              </a:ext>
+            </a:extLst>
+          </a:blip>
+          <a:stretch>
+            <a:fillRect/>
+          </a:stretch>
+        </p:blipFill>
+        <p:spPr>
+          <a:xfrm>
+            <a:off x="2183728" y="492094"/>
+            <a:ext cx="9163276" cy="5291252"/>
+          </a:xfrm>
+          <a:prstGeom prst="rect">
+            <a:avLst/>
+          </a:prstGeom>
+        </p:spPr>
+      </p:pic>
+      <p:sp>
+        <p:nvSpPr>
+          <p:cNvPr id="7" name="Rectangle 6">
+            <a:extLst>
+              <a:ext uri="{FF2B5EF4-FFF2-40B4-BE49-F238E27FC236}">
+                <a16:creationId xmlns:a16="http://schemas.microsoft.com/office/drawing/2014/main" id="{D2458800-57BC-4893-BE11-DC146BD84648}"/>
+              </a:ext>
+            </a:extLst>
+          </p:cNvPr>
+          <p:cNvSpPr/>
+          <p:nvPr/>
+        </p:nvSpPr>
+        <p:spPr>
+          <a:xfrm>
+            <a:off x="2623741" y="0"/>
+            <a:ext cx="6944529" cy="923330"/>
+          </a:xfrm>
+          <a:prstGeom prst="rect">
+            <a:avLst/>
+          </a:prstGeom>
+          <a:noFill/>
+        </p:spPr>
+        <p:txBody>
+          <a:bodyPr wrap="none" lIns="91440" tIns="45720" rIns="91440" bIns="45720">
+            <a:spAutoFit/>
+          </a:bodyPr>
+          <a:lstStyle/>
+          <a:p>
+            <a:pPr algn="ctr"/>
+            <a:r>
+              <a:rPr lang="he-IL" sz="5400" b="1" cap="none" spc="0" dirty="0">
+                <a:ln w="9525">
+                  <a:solidFill>
+                    <a:schemeClr val="bg1"/>
+                  </a:solidFill>
+                  <a:prstDash val="solid"/>
+                </a:ln>
+                <a:solidFill>
+                  <a:schemeClr val="accent5"/>
+                </a:solidFill>
+                <a:effectLst>
+                  <a:outerShdw blurRad="12700" dist="38100" dir="2700000" algn="tl" rotWithShape="0">
+                    <a:schemeClr val="accent5">
+                      <a:lumMod val="60000"/>
+                      <a:lumOff val="40000"/>
+                    </a:schemeClr>
+                  </a:outerShdw>
+                </a:effectLst>
+              </a:rPr>
+              <a:t>ניסוי במעקב אחר תנועה</a:t>
+            </a:r>
+            <a:endParaRPr lang="en-US" sz="5400" b="1" cap="none" spc="0" dirty="0">
+              <a:ln w="9525">
+                <a:solidFill>
+                  <a:schemeClr val="bg1"/>
+                </a:solidFill>
+                <a:prstDash val="solid"/>
+              </a:ln>
+              <a:solidFill>
+                <a:schemeClr val="accent5"/>
+              </a:solidFill>
+              <a:effectLst>
+                <a:outerShdw blurRad="12700" dist="38100" dir="2700000" algn="tl" rotWithShape="0">
+                  <a:schemeClr val="accent5">
+                    <a:lumMod val="60000"/>
+                    <a:lumOff val="40000"/>
+                  </a:schemeClr>
+                </a:outerShdw>
+              </a:effectLst>
+            </a:endParaRPr>
+          </a:p>
+        </p:txBody>
+      </p:sp>
+      <p:sp>
+        <p:nvSpPr>
+          <p:cNvPr id="9" name="TextBox 8">
+            <a:extLst>
+              <a:ext uri="{FF2B5EF4-FFF2-40B4-BE49-F238E27FC236}">
+                <a16:creationId xmlns:a16="http://schemas.microsoft.com/office/drawing/2014/main" id="{1487C03B-BC0F-4484-BF6E-CBFA484A2495}"/>
+              </a:ext>
+            </a:extLst>
+          </p:cNvPr>
+          <p:cNvSpPr txBox="1"/>
+          <p:nvPr/>
+        </p:nvSpPr>
+        <p:spPr>
+          <a:xfrm>
+            <a:off x="-122548" y="5240205"/>
+            <a:ext cx="12851874" cy="1692771"/>
+          </a:xfrm>
+          <a:prstGeom prst="rect">
+            <a:avLst/>
+          </a:prstGeom>
+          <a:noFill/>
+        </p:spPr>
+        <p:txBody>
+          <a:bodyPr wrap="square" rtlCol="1">
+            <a:spAutoFit/>
+          </a:bodyPr>
+          <a:lstStyle/>
+          <a:p>
+            <a:pPr algn="ctr" rtl="1"/>
+            <a:r>
+              <a:rPr lang="he-IL" sz="3200" b="1" dirty="0">
+                <a:ln>
+                  <a:solidFill>
+                    <a:schemeClr val="tx1">
+                      <a:lumMod val="65000"/>
+                      <a:lumOff val="35000"/>
+                    </a:schemeClr>
+                  </a:solidFill>
+                </a:ln>
+                <a:solidFill>
+                  <a:schemeClr val="accent5">
+                    <a:lumMod val="75000"/>
+                  </a:schemeClr>
+                </a:solidFill>
+              </a:rPr>
+              <a:t>מיועד לגילאי 18-35, יד ימין דומיננטית, ללא הפרעות קשב וריכוז</a:t>
+            </a:r>
+            <a:endParaRPr lang="en-US" sz="3200" b="1" dirty="0">
+              <a:ln>
+                <a:solidFill>
+                  <a:schemeClr val="tx1">
+                    <a:lumMod val="65000"/>
+                    <a:lumOff val="35000"/>
+                  </a:schemeClr>
+                </a:solidFill>
+              </a:ln>
+              <a:solidFill>
+                <a:schemeClr val="accent5">
+                  <a:lumMod val="75000"/>
+                </a:schemeClr>
+              </a:solidFill>
+            </a:endParaRPr>
+          </a:p>
+          <a:p>
+            <a:pPr algn="ctr" rtl="1"/>
+            <a:r>
+              <a:rPr lang="he-IL" sz="2400" b="1" dirty="0">
+                <a:ln>
+                  <a:solidFill>
+                    <a:schemeClr val="tx1">
+                      <a:lumMod val="65000"/>
+                      <a:lumOff val="35000"/>
+                    </a:schemeClr>
+                  </a:solidFill>
+                </a:ln>
+                <a:solidFill>
+                  <a:schemeClr val="accent5">
+                    <a:lumMod val="75000"/>
+                  </a:schemeClr>
+                </a:solidFill>
+              </a:rPr>
+              <a:t>בניין שרת, חדר 118, אוניברסיטת תל אביב</a:t>
+            </a:r>
+          </a:p>
+          <a:p>
+            <a:pPr algn="ctr" rtl="1"/>
+            <a:r>
+              <a:rPr lang="he-IL" sz="2400" b="1" dirty="0">
+                <a:ln>
+                  <a:solidFill>
+                    <a:schemeClr val="tx1">
+                      <a:lumMod val="65000"/>
+                      <a:lumOff val="35000"/>
+                    </a:schemeClr>
+                  </a:solidFill>
+                </a:ln>
+                <a:solidFill>
+                  <a:schemeClr val="accent5">
+                    <a:lumMod val="75000"/>
+                  </a:schemeClr>
+                </a:solidFill>
+              </a:rPr>
+              <a:t>הניסוי נערך ב-2 ימים עוקבים, היום הראשון נמשך 30 דקות והשני 90 דקות</a:t>
+            </a:r>
+            <a:endParaRPr lang="en-US" sz="2400" b="1" dirty="0">
+              <a:ln>
+                <a:solidFill>
+                  <a:schemeClr val="tx1">
+                    <a:lumMod val="65000"/>
+                    <a:lumOff val="35000"/>
+                  </a:schemeClr>
+                </a:solidFill>
+              </a:ln>
+              <a:solidFill>
+                <a:schemeClr val="accent5">
+                  <a:lumMod val="75000"/>
+                </a:schemeClr>
+              </a:solidFill>
+            </a:endParaRPr>
+          </a:p>
+          <a:p>
+            <a:pPr algn="ctr" rtl="1"/>
+            <a:r>
+              <a:rPr lang="he-IL" sz="2400" b="1" dirty="0">
+                <a:ln>
+                  <a:solidFill>
+                    <a:schemeClr val="tx1">
+                      <a:lumMod val="65000"/>
+                      <a:lumOff val="35000"/>
+                    </a:schemeClr>
+                  </a:solidFill>
+                </a:ln>
+                <a:solidFill>
+                  <a:schemeClr val="accent5">
+                    <a:lumMod val="75000"/>
+                  </a:schemeClr>
+                </a:solidFill>
+              </a:rPr>
+              <a:t>לפרטים: </a:t>
+            </a:r>
+            <a:r>
+              <a:rPr lang="en-US" sz="2400" b="1" u="sng" dirty="0">
+                <a:ln>
+                  <a:solidFill>
+                    <a:schemeClr val="tx1">
+                      <a:lumMod val="65000"/>
+                      <a:lumOff val="35000"/>
+                    </a:schemeClr>
+                  </a:solidFill>
+                </a:ln>
+                <a:solidFill>
+                  <a:schemeClr val="accent5">
+                    <a:lumMod val="75000"/>
+                  </a:schemeClr>
+                </a:solidFill>
+              </a:rPr>
+              <a:t>khenheller@mail.tau.ac.il</a:t>
+            </a:r>
+            <a:endParaRPr lang="he-IL" sz="2400" b="1" u="sng" dirty="0">
+              <a:ln>
+                <a:solidFill>
+                  <a:schemeClr val="tx1">
+                    <a:lumMod val="65000"/>
+                    <a:lumOff val="35000"/>
+                  </a:schemeClr>
+                </a:solidFill>
+              </a:ln>
+              <a:solidFill>
+                <a:schemeClr val="accent5">
+                  <a:lumMod val="75000"/>
+                </a:schemeClr>
+              </a:solidFill>
+            </a:endParaRPr>
+          </a:p>
+        </p:txBody>
+      </p:sp>
+      <p:sp>
+        <p:nvSpPr>
+          <p:cNvPr id="10" name="Rectangle 9">
+            <a:extLst>
+              <a:ext uri="{FF2B5EF4-FFF2-40B4-BE49-F238E27FC236}">
+                <a16:creationId xmlns:a16="http://schemas.microsoft.com/office/drawing/2014/main" id="{A8714759-5C3C-479D-B957-02304E4D0F50}"/>
+              </a:ext>
+            </a:extLst>
+          </p:cNvPr>
+          <p:cNvSpPr/>
+          <p:nvPr/>
+        </p:nvSpPr>
+        <p:spPr>
+          <a:xfrm>
+            <a:off x="3672324" y="938461"/>
+            <a:ext cx="4886274" cy="769441"/>
+          </a:xfrm>
+          <a:prstGeom prst="rect">
+            <a:avLst/>
+          </a:prstGeom>
+          <a:noFill/>
+        </p:spPr>
+        <p:txBody>
+          <a:bodyPr wrap="none" lIns="91440" tIns="45720" rIns="91440" bIns="45720">
+            <a:spAutoFit/>
+            <a:scene3d>
+              <a:camera prst="perspectiveFront"/>
+              <a:lightRig rig="harsh" dir="t"/>
+            </a:scene3d>
+            <a:sp3d extrusionH="57150" prstMaterial="matte">
+              <a:bevelT w="63500" h="12700" prst="slope"/>
+              <a:contourClr>
+                <a:schemeClr val="bg1">
+                  <a:lumMod val="65000"/>
+                </a:schemeClr>
+              </a:contourClr>
+            </a:sp3d>
+          </a:bodyPr>
+          <a:lstStyle/>
+          <a:p>
+            <a:pPr algn="ctr" rtl="1"/>
+            <a:r>
+              <a:rPr lang="he-IL" sz="4400" b="1" dirty="0">
+                <a:ln/>
+                <a:solidFill>
+                  <a:srgbClr val="09FF32"/>
+                </a:solidFill>
+                <a:effectLst>
+                  <a:glow rad="787400">
+                    <a:schemeClr val="bg1">
+                      <a:alpha val="40000"/>
+                    </a:schemeClr>
+                  </a:glow>
+                </a:effectLst>
+              </a:rPr>
+              <a:t>120 </a:t>
+            </a:r>
+            <a:r>
+              <a:rPr lang="he-IL" sz="4400" b="1" cap="none" spc="0" dirty="0">
+                <a:ln/>
+                <a:solidFill>
+                  <a:srgbClr val="09FF32"/>
+                </a:solidFill>
+                <a:effectLst>
+                  <a:glow rad="787400">
+                    <a:schemeClr val="bg1">
+                      <a:alpha val="40000"/>
+                    </a:schemeClr>
+                  </a:glow>
+                </a:effectLst>
+              </a:rPr>
+              <a:t>דקות, 100 ש"ח</a:t>
+            </a:r>
+            <a:endParaRPr lang="en-US" sz="4400" b="1" cap="none" spc="0" dirty="0">
+              <a:ln/>
+              <a:solidFill>
+                <a:srgbClr val="09FF32"/>
+              </a:solidFill>
+              <a:effectLst>
+                <a:glow rad="787400">
+                  <a:schemeClr val="bg1">
+                    <a:alpha val="40000"/>
+                  </a:schemeClr>
+                </a:glow>
+              </a:effectLst>
+            </a:endParaRPr>
+          </a:p>
+        </p:txBody>
+      </p:sp>
+    </p:spTree>
+    <p:extLst>
+      <p:ext uri="{BB962C8B-B14F-4D97-AF65-F5344CB8AC3E}">
+        <p14:creationId xmlns:p14="http://schemas.microsoft.com/office/powerpoint/2010/main" val="3908578938"/>
+      </p:ext>
+    </p:extLst>
+  </p:cSld>
+  <p:clrMapOvr>
+    <a:masterClrMapping/>
+  </p:clrMapOvr>
+</p:sld>
+</file>
+
 <file path=ppt/theme/theme1.xml><?xml version="1.0" encoding="utf-8"?>
 <a:theme xmlns:a="http://schemas.openxmlformats.org/drawingml/2006/main" name="Office Theme">
   <a:themeElements>

</xml_diff>

<commit_message>
Statistical test if subject categorization is at chance
</commit_message>
<xml_diff>
--- a/experiment/subject_recruitment/מודעות גיוס.pptx
+++ b/experiment/subject_recruitment/מודעות גיוס.pptx
@@ -8,6 +8,7 @@
     <p:sldId id="256" r:id="rId2"/>
     <p:sldId id="257" r:id="rId3"/>
     <p:sldId id="258" r:id="rId4"/>
+    <p:sldId id="259" r:id="rId5"/>
   </p:sldIdLst>
   <p:sldSz cx="12192000" cy="6858000"/>
   <p:notesSz cx="6858000" cy="9144000"/>
@@ -263,7 +264,7 @@
           <a:p>
             <a:fld id="{351EEA5B-5A71-4DF3-A5C7-778567C98FB4}" type="datetimeFigureOut">
               <a:rPr lang="he-IL" smtClean="0"/>
-              <a:t>כ'/תשרי/תשפ"ב</a:t>
+              <a:t>כ"ט/תשרי/תשפ"ב</a:t>
             </a:fld>
             <a:endParaRPr lang="he-IL"/>
           </a:p>
@@ -463,7 +464,7 @@
           <a:p>
             <a:fld id="{351EEA5B-5A71-4DF3-A5C7-778567C98FB4}" type="datetimeFigureOut">
               <a:rPr lang="he-IL" smtClean="0"/>
-              <a:t>כ'/תשרי/תשפ"ב</a:t>
+              <a:t>כ"ט/תשרי/תשפ"ב</a:t>
             </a:fld>
             <a:endParaRPr lang="he-IL"/>
           </a:p>
@@ -673,7 +674,7 @@
           <a:p>
             <a:fld id="{351EEA5B-5A71-4DF3-A5C7-778567C98FB4}" type="datetimeFigureOut">
               <a:rPr lang="he-IL" smtClean="0"/>
-              <a:t>כ'/תשרי/תשפ"ב</a:t>
+              <a:t>כ"ט/תשרי/תשפ"ב</a:t>
             </a:fld>
             <a:endParaRPr lang="he-IL"/>
           </a:p>
@@ -873,7 +874,7 @@
           <a:p>
             <a:fld id="{351EEA5B-5A71-4DF3-A5C7-778567C98FB4}" type="datetimeFigureOut">
               <a:rPr lang="he-IL" smtClean="0"/>
-              <a:t>כ'/תשרי/תשפ"ב</a:t>
+              <a:t>כ"ט/תשרי/תשפ"ב</a:t>
             </a:fld>
             <a:endParaRPr lang="he-IL"/>
           </a:p>
@@ -1149,7 +1150,7 @@
           <a:p>
             <a:fld id="{351EEA5B-5A71-4DF3-A5C7-778567C98FB4}" type="datetimeFigureOut">
               <a:rPr lang="he-IL" smtClean="0"/>
-              <a:t>כ'/תשרי/תשפ"ב</a:t>
+              <a:t>כ"ט/תשרי/תשפ"ב</a:t>
             </a:fld>
             <a:endParaRPr lang="he-IL"/>
           </a:p>
@@ -1417,7 +1418,7 @@
           <a:p>
             <a:fld id="{351EEA5B-5A71-4DF3-A5C7-778567C98FB4}" type="datetimeFigureOut">
               <a:rPr lang="he-IL" smtClean="0"/>
-              <a:t>כ'/תשרי/תשפ"ב</a:t>
+              <a:t>כ"ט/תשרי/תשפ"ב</a:t>
             </a:fld>
             <a:endParaRPr lang="he-IL"/>
           </a:p>
@@ -1832,7 +1833,7 @@
           <a:p>
             <a:fld id="{351EEA5B-5A71-4DF3-A5C7-778567C98FB4}" type="datetimeFigureOut">
               <a:rPr lang="he-IL" smtClean="0"/>
-              <a:t>כ'/תשרי/תשפ"ב</a:t>
+              <a:t>כ"ט/תשרי/תשפ"ב</a:t>
             </a:fld>
             <a:endParaRPr lang="he-IL"/>
           </a:p>
@@ -1974,7 +1975,7 @@
           <a:p>
             <a:fld id="{351EEA5B-5A71-4DF3-A5C7-778567C98FB4}" type="datetimeFigureOut">
               <a:rPr lang="he-IL" smtClean="0"/>
-              <a:t>כ'/תשרי/תשפ"ב</a:t>
+              <a:t>כ"ט/תשרי/תשפ"ב</a:t>
             </a:fld>
             <a:endParaRPr lang="he-IL"/>
           </a:p>
@@ -2087,7 +2088,7 @@
           <a:p>
             <a:fld id="{351EEA5B-5A71-4DF3-A5C7-778567C98FB4}" type="datetimeFigureOut">
               <a:rPr lang="he-IL" smtClean="0"/>
-              <a:t>כ'/תשרי/תשפ"ב</a:t>
+              <a:t>כ"ט/תשרי/תשפ"ב</a:t>
             </a:fld>
             <a:endParaRPr lang="he-IL"/>
           </a:p>
@@ -2400,7 +2401,7 @@
           <a:p>
             <a:fld id="{351EEA5B-5A71-4DF3-A5C7-778567C98FB4}" type="datetimeFigureOut">
               <a:rPr lang="he-IL" smtClean="0"/>
-              <a:t>כ'/תשרי/תשפ"ב</a:t>
+              <a:t>כ"ט/תשרי/תשפ"ב</a:t>
             </a:fld>
             <a:endParaRPr lang="he-IL"/>
           </a:p>
@@ -2689,7 +2690,7 @@
           <a:p>
             <a:fld id="{351EEA5B-5A71-4DF3-A5C7-778567C98FB4}" type="datetimeFigureOut">
               <a:rPr lang="he-IL" smtClean="0"/>
-              <a:t>כ'/תשרי/תשפ"ב</a:t>
+              <a:t>כ"ט/תשרי/תשפ"ב</a:t>
             </a:fld>
             <a:endParaRPr lang="he-IL"/>
           </a:p>
@@ -2932,7 +2933,7 @@
           <a:p>
             <a:fld id="{351EEA5B-5A71-4DF3-A5C7-778567C98FB4}" type="datetimeFigureOut">
               <a:rPr lang="he-IL" smtClean="0"/>
-              <a:t>כ'/תשרי/תשפ"ב</a:t>
+              <a:t>כ"ט/תשרי/תשפ"ב</a:t>
             </a:fld>
             <a:endParaRPr lang="he-IL"/>
           </a:p>
@@ -4507,6 +4508,686 @@
 </p:sld>
 </file>
 
+<file path=ppt/slides/slide4.xml><?xml version="1.0" encoding="utf-8"?>
+<p:sld xmlns:a="http://schemas.openxmlformats.org/drawingml/2006/main" xmlns:r="http://schemas.openxmlformats.org/officeDocument/2006/relationships" xmlns:p="http://schemas.openxmlformats.org/presentationml/2006/main">
+  <p:cSld>
+    <p:spTree>
+      <p:nvGrpSpPr>
+        <p:cNvPr id="1" name=""/>
+        <p:cNvGrpSpPr/>
+        <p:nvPr/>
+      </p:nvGrpSpPr>
+      <p:grpSpPr>
+        <a:xfrm>
+          <a:off x="0" y="0"/>
+          <a:ext cx="0" cy="0"/>
+          <a:chOff x="0" y="0"/>
+          <a:chExt cx="0" cy="0"/>
+        </a:xfrm>
+      </p:grpSpPr>
+      <p:pic>
+        <p:nvPicPr>
+          <p:cNvPr id="5" name="Picture 4" descr="A dog looking at a computer&#10;&#10;Description automatically generated with medium confidence">
+            <a:extLst>
+              <a:ext uri="{FF2B5EF4-FFF2-40B4-BE49-F238E27FC236}">
+                <a16:creationId xmlns:a16="http://schemas.microsoft.com/office/drawing/2014/main" id="{787A8A51-6B78-4086-836D-3DE6CB859905}"/>
+              </a:ext>
+            </a:extLst>
+          </p:cNvPr>
+          <p:cNvPicPr>
+            <a:picLocks noChangeAspect="1"/>
+          </p:cNvPicPr>
+          <p:nvPr/>
+        </p:nvPicPr>
+        <p:blipFill>
+          <a:blip r:embed="rId2">
+            <a:alphaModFix amt="70000"/>
+            <a:extLst>
+              <a:ext uri="{28A0092B-C50C-407E-A947-70E740481C1C}">
+                <a14:useLocalDpi xmlns:a14="http://schemas.microsoft.com/office/drawing/2010/main" val="0"/>
+              </a:ext>
+            </a:extLst>
+          </a:blip>
+          <a:stretch>
+            <a:fillRect/>
+          </a:stretch>
+        </p:blipFill>
+        <p:spPr>
+          <a:xfrm>
+            <a:off x="2183728" y="492094"/>
+            <a:ext cx="9163276" cy="5291252"/>
+          </a:xfrm>
+          <a:prstGeom prst="rect">
+            <a:avLst/>
+          </a:prstGeom>
+        </p:spPr>
+      </p:pic>
+      <p:sp>
+        <p:nvSpPr>
+          <p:cNvPr id="7" name="Rectangle 6">
+            <a:extLst>
+              <a:ext uri="{FF2B5EF4-FFF2-40B4-BE49-F238E27FC236}">
+                <a16:creationId xmlns:a16="http://schemas.microsoft.com/office/drawing/2014/main" id="{D2458800-57BC-4893-BE11-DC146BD84648}"/>
+              </a:ext>
+            </a:extLst>
+          </p:cNvPr>
+          <p:cNvSpPr/>
+          <p:nvPr/>
+        </p:nvSpPr>
+        <p:spPr>
+          <a:xfrm>
+            <a:off x="2452225" y="-155648"/>
+            <a:ext cx="7287572" cy="1754326"/>
+          </a:xfrm>
+          <a:prstGeom prst="rect">
+            <a:avLst/>
+          </a:prstGeom>
+          <a:noFill/>
+        </p:spPr>
+        <p:txBody>
+          <a:bodyPr wrap="none" lIns="91440" tIns="45720" rIns="91440" bIns="45720">
+            <a:spAutoFit/>
+          </a:bodyPr>
+          <a:lstStyle/>
+          <a:p>
+            <a:pPr algn="ctr"/>
+            <a:r>
+              <a:rPr lang="he-IL" sz="5400" b="1" cap="none" spc="0" dirty="0">
+                <a:ln w="9525">
+                  <a:solidFill>
+                    <a:schemeClr val="bg1"/>
+                  </a:solidFill>
+                  <a:prstDash val="solid"/>
+                </a:ln>
+                <a:solidFill>
+                  <a:schemeClr val="accent5"/>
+                </a:solidFill>
+                <a:effectLst>
+                  <a:outerShdw blurRad="12700" dist="38100" dir="2700000" algn="tl" rotWithShape="0">
+                    <a:schemeClr val="accent5">
+                      <a:lumMod val="60000"/>
+                      <a:lumOff val="40000"/>
+                    </a:schemeClr>
+                  </a:outerShdw>
+                </a:effectLst>
+              </a:rPr>
+              <a:t>מחפשים משתתפים</a:t>
+            </a:r>
+          </a:p>
+          <a:p>
+            <a:pPr algn="ctr"/>
+            <a:r>
+              <a:rPr lang="he-IL" sz="5400" b="1" dirty="0">
+                <a:ln w="9525">
+                  <a:solidFill>
+                    <a:schemeClr val="bg1"/>
+                  </a:solidFill>
+                  <a:prstDash val="solid"/>
+                </a:ln>
+                <a:solidFill>
+                  <a:schemeClr val="accent5"/>
+                </a:solidFill>
+                <a:effectLst>
+                  <a:outerShdw blurRad="12700" dist="38100" dir="2700000" algn="tl" rotWithShape="0">
+                    <a:schemeClr val="accent5">
+                      <a:lumMod val="60000"/>
+                      <a:lumOff val="40000"/>
+                    </a:schemeClr>
+                  </a:outerShdw>
+                </a:effectLst>
+              </a:rPr>
+              <a:t>ל</a:t>
+            </a:r>
+            <a:r>
+              <a:rPr lang="he-IL" sz="5400" b="1" cap="none" spc="0" dirty="0">
+                <a:ln w="9525">
+                  <a:solidFill>
+                    <a:schemeClr val="bg1"/>
+                  </a:solidFill>
+                  <a:prstDash val="solid"/>
+                </a:ln>
+                <a:solidFill>
+                  <a:schemeClr val="accent5"/>
+                </a:solidFill>
+                <a:effectLst>
+                  <a:outerShdw blurRad="12700" dist="38100" dir="2700000" algn="tl" rotWithShape="0">
+                    <a:schemeClr val="accent5">
+                      <a:lumMod val="60000"/>
+                      <a:lumOff val="40000"/>
+                    </a:schemeClr>
+                  </a:outerShdw>
+                </a:effectLst>
+              </a:rPr>
+              <a:t>ניסוי במעקב אחר תנועה</a:t>
+            </a:r>
+            <a:endParaRPr lang="en-US" sz="5400" b="1" cap="none" spc="0" dirty="0">
+              <a:ln w="9525">
+                <a:solidFill>
+                  <a:schemeClr val="bg1"/>
+                </a:solidFill>
+                <a:prstDash val="solid"/>
+              </a:ln>
+              <a:solidFill>
+                <a:schemeClr val="accent5"/>
+              </a:solidFill>
+              <a:effectLst>
+                <a:outerShdw blurRad="12700" dist="38100" dir="2700000" algn="tl" rotWithShape="0">
+                  <a:schemeClr val="accent5">
+                    <a:lumMod val="60000"/>
+                    <a:lumOff val="40000"/>
+                  </a:schemeClr>
+                </a:outerShdw>
+              </a:effectLst>
+            </a:endParaRPr>
+          </a:p>
+        </p:txBody>
+      </p:sp>
+      <p:sp>
+        <p:nvSpPr>
+          <p:cNvPr id="9" name="TextBox 8">
+            <a:extLst>
+              <a:ext uri="{FF2B5EF4-FFF2-40B4-BE49-F238E27FC236}">
+                <a16:creationId xmlns:a16="http://schemas.microsoft.com/office/drawing/2014/main" id="{1487C03B-BC0F-4484-BF6E-CBFA484A2495}"/>
+              </a:ext>
+            </a:extLst>
+          </p:cNvPr>
+          <p:cNvSpPr txBox="1"/>
+          <p:nvPr/>
+        </p:nvSpPr>
+        <p:spPr>
+          <a:xfrm>
+            <a:off x="-122548" y="5240205"/>
+            <a:ext cx="12851874" cy="1692771"/>
+          </a:xfrm>
+          <a:prstGeom prst="rect">
+            <a:avLst/>
+          </a:prstGeom>
+          <a:noFill/>
+        </p:spPr>
+        <p:txBody>
+          <a:bodyPr wrap="square" rtlCol="1">
+            <a:spAutoFit/>
+          </a:bodyPr>
+          <a:lstStyle/>
+          <a:p>
+            <a:pPr algn="ctr" rtl="1"/>
+            <a:r>
+              <a:rPr lang="he-IL" sz="3200" b="1" dirty="0">
+                <a:ln>
+                  <a:solidFill>
+                    <a:schemeClr val="tx1">
+                      <a:lumMod val="65000"/>
+                      <a:lumOff val="35000"/>
+                    </a:schemeClr>
+                  </a:solidFill>
+                </a:ln>
+                <a:solidFill>
+                  <a:schemeClr val="accent5">
+                    <a:lumMod val="75000"/>
+                  </a:schemeClr>
+                </a:solidFill>
+              </a:rPr>
+              <a:t>מיועד לגילאי 18-35, יד ימין דומיננטית, ללא הפרעות קשב וריכוז</a:t>
+            </a:r>
+            <a:endParaRPr lang="en-US" sz="3200" b="1" dirty="0">
+              <a:ln>
+                <a:solidFill>
+                  <a:schemeClr val="tx1">
+                    <a:lumMod val="65000"/>
+                    <a:lumOff val="35000"/>
+                  </a:schemeClr>
+                </a:solidFill>
+              </a:ln>
+              <a:solidFill>
+                <a:schemeClr val="accent5">
+                  <a:lumMod val="75000"/>
+                </a:schemeClr>
+              </a:solidFill>
+            </a:endParaRPr>
+          </a:p>
+          <a:p>
+            <a:pPr algn="ctr" rtl="1"/>
+            <a:r>
+              <a:rPr lang="he-IL" sz="2400" b="1" dirty="0">
+                <a:ln>
+                  <a:solidFill>
+                    <a:schemeClr val="tx1">
+                      <a:lumMod val="65000"/>
+                      <a:lumOff val="35000"/>
+                    </a:schemeClr>
+                  </a:solidFill>
+                </a:ln>
+                <a:solidFill>
+                  <a:schemeClr val="accent5">
+                    <a:lumMod val="75000"/>
+                  </a:schemeClr>
+                </a:solidFill>
+              </a:rPr>
+              <a:t>בניין שרת, חדר 118, אוניברסיטת תל אביב</a:t>
+            </a:r>
+          </a:p>
+          <a:p>
+            <a:pPr algn="ctr" rtl="1"/>
+            <a:r>
+              <a:rPr lang="he-IL" sz="2400" b="1" dirty="0">
+                <a:ln>
+                  <a:solidFill>
+                    <a:schemeClr val="tx1">
+                      <a:lumMod val="65000"/>
+                      <a:lumOff val="35000"/>
+                    </a:schemeClr>
+                  </a:solidFill>
+                </a:ln>
+                <a:solidFill>
+                  <a:schemeClr val="accent5">
+                    <a:lumMod val="75000"/>
+                  </a:schemeClr>
+                </a:solidFill>
+              </a:rPr>
+              <a:t>הניסוי נערך ב-2 ימים עוקבים, היום הראשון נמשך 30 דקות והשני 90 דקות</a:t>
+            </a:r>
+            <a:endParaRPr lang="en-US" sz="2400" b="1" dirty="0">
+              <a:ln>
+                <a:solidFill>
+                  <a:schemeClr val="tx1">
+                    <a:lumMod val="65000"/>
+                    <a:lumOff val="35000"/>
+                  </a:schemeClr>
+                </a:solidFill>
+              </a:ln>
+              <a:solidFill>
+                <a:schemeClr val="accent5">
+                  <a:lumMod val="75000"/>
+                </a:schemeClr>
+              </a:solidFill>
+            </a:endParaRPr>
+          </a:p>
+          <a:p>
+            <a:pPr algn="ctr" rtl="1"/>
+            <a:r>
+              <a:rPr lang="he-IL" sz="2400" b="1" dirty="0">
+                <a:ln>
+                  <a:solidFill>
+                    <a:schemeClr val="tx1">
+                      <a:lumMod val="65000"/>
+                      <a:lumOff val="35000"/>
+                    </a:schemeClr>
+                  </a:solidFill>
+                </a:ln>
+                <a:solidFill>
+                  <a:schemeClr val="accent5">
+                    <a:lumMod val="75000"/>
+                  </a:schemeClr>
+                </a:solidFill>
+              </a:rPr>
+              <a:t>לפרטים: </a:t>
+            </a:r>
+            <a:r>
+              <a:rPr lang="en-US" sz="2400" b="1" u="sng" dirty="0">
+                <a:ln>
+                  <a:solidFill>
+                    <a:schemeClr val="tx1">
+                      <a:lumMod val="65000"/>
+                      <a:lumOff val="35000"/>
+                    </a:schemeClr>
+                  </a:solidFill>
+                </a:ln>
+                <a:solidFill>
+                  <a:schemeClr val="accent5">
+                    <a:lumMod val="75000"/>
+                  </a:schemeClr>
+                </a:solidFill>
+              </a:rPr>
+              <a:t>khenheller@mail.tau.ac.il</a:t>
+            </a:r>
+            <a:endParaRPr lang="he-IL" sz="2400" b="1" u="sng" dirty="0">
+              <a:ln>
+                <a:solidFill>
+                  <a:schemeClr val="tx1">
+                    <a:lumMod val="65000"/>
+                    <a:lumOff val="35000"/>
+                  </a:schemeClr>
+                </a:solidFill>
+              </a:ln>
+              <a:solidFill>
+                <a:schemeClr val="accent5">
+                  <a:lumMod val="75000"/>
+                </a:schemeClr>
+              </a:solidFill>
+            </a:endParaRPr>
+          </a:p>
+        </p:txBody>
+      </p:sp>
+      <p:sp>
+        <p:nvSpPr>
+          <p:cNvPr id="10" name="Rectangle 9">
+            <a:extLst>
+              <a:ext uri="{FF2B5EF4-FFF2-40B4-BE49-F238E27FC236}">
+                <a16:creationId xmlns:a16="http://schemas.microsoft.com/office/drawing/2014/main" id="{A8714759-5C3C-479D-B957-02304E4D0F50}"/>
+              </a:ext>
+            </a:extLst>
+          </p:cNvPr>
+          <p:cNvSpPr/>
+          <p:nvPr/>
+        </p:nvSpPr>
+        <p:spPr>
+          <a:xfrm>
+            <a:off x="4889003" y="3336197"/>
+            <a:ext cx="2452915" cy="769441"/>
+          </a:xfrm>
+          <a:prstGeom prst="rect">
+            <a:avLst/>
+          </a:prstGeom>
+          <a:noFill/>
+        </p:spPr>
+        <p:txBody>
+          <a:bodyPr wrap="none" lIns="91440" tIns="45720" rIns="91440" bIns="45720">
+            <a:spAutoFit/>
+            <a:scene3d>
+              <a:camera prst="perspectiveFront"/>
+              <a:lightRig rig="harsh" dir="t"/>
+            </a:scene3d>
+            <a:sp3d extrusionH="57150" prstMaterial="matte">
+              <a:bevelT w="63500" h="12700" prst="slope"/>
+              <a:contourClr>
+                <a:schemeClr val="bg1">
+                  <a:lumMod val="65000"/>
+                </a:schemeClr>
+              </a:contourClr>
+            </a:sp3d>
+          </a:bodyPr>
+          <a:lstStyle/>
+          <a:p>
+            <a:pPr algn="ctr" rtl="1"/>
+            <a:r>
+              <a:rPr lang="he-IL" sz="4400" b="1" dirty="0">
+                <a:ln/>
+                <a:solidFill>
+                  <a:srgbClr val="09FF32"/>
+                </a:solidFill>
+                <a:effectLst>
+                  <a:glow rad="1371600">
+                    <a:schemeClr val="bg1">
+                      <a:alpha val="78000"/>
+                    </a:schemeClr>
+                  </a:glow>
+                </a:effectLst>
+              </a:rPr>
+              <a:t>120 </a:t>
+            </a:r>
+            <a:r>
+              <a:rPr lang="he-IL" sz="4400" b="1" cap="none" spc="0" dirty="0">
+                <a:ln/>
+                <a:solidFill>
+                  <a:srgbClr val="09FF32"/>
+                </a:solidFill>
+                <a:effectLst>
+                  <a:glow rad="1371600">
+                    <a:schemeClr val="bg1">
+                      <a:alpha val="78000"/>
+                    </a:schemeClr>
+                  </a:glow>
+                </a:effectLst>
+              </a:rPr>
+              <a:t>דקות</a:t>
+            </a:r>
+          </a:p>
+        </p:txBody>
+      </p:sp>
+      <p:sp>
+        <p:nvSpPr>
+          <p:cNvPr id="12" name="Rectangle 11">
+            <a:extLst>
+              <a:ext uri="{FF2B5EF4-FFF2-40B4-BE49-F238E27FC236}">
+                <a16:creationId xmlns:a16="http://schemas.microsoft.com/office/drawing/2014/main" id="{52E00DE4-D74C-41C6-B61C-987C596DEA10}"/>
+              </a:ext>
+            </a:extLst>
+          </p:cNvPr>
+          <p:cNvSpPr/>
+          <p:nvPr/>
+        </p:nvSpPr>
+        <p:spPr>
+          <a:xfrm>
+            <a:off x="4989478" y="4640130"/>
+            <a:ext cx="2303836" cy="769441"/>
+          </a:xfrm>
+          <a:prstGeom prst="rect">
+            <a:avLst/>
+          </a:prstGeom>
+          <a:noFill/>
+        </p:spPr>
+        <p:txBody>
+          <a:bodyPr wrap="none" lIns="91440" tIns="45720" rIns="91440" bIns="45720">
+            <a:spAutoFit/>
+            <a:scene3d>
+              <a:camera prst="perspectiveFront"/>
+              <a:lightRig rig="harsh" dir="t"/>
+            </a:scene3d>
+            <a:sp3d extrusionH="57150" prstMaterial="matte">
+              <a:bevelT w="63500" h="12700" prst="slope"/>
+              <a:contourClr>
+                <a:schemeClr val="bg1">
+                  <a:lumMod val="65000"/>
+                </a:schemeClr>
+              </a:contourClr>
+            </a:sp3d>
+          </a:bodyPr>
+          <a:lstStyle/>
+          <a:p>
+            <a:pPr algn="ctr" rtl="1"/>
+            <a:r>
+              <a:rPr lang="he-IL" sz="4400" b="1" cap="none" spc="0" dirty="0">
+                <a:ln/>
+                <a:solidFill>
+                  <a:srgbClr val="09FF32"/>
+                </a:solidFill>
+                <a:effectLst>
+                  <a:glow rad="1371600">
+                    <a:schemeClr val="bg1">
+                      <a:alpha val="78000"/>
+                    </a:schemeClr>
+                  </a:glow>
+                </a:effectLst>
+              </a:rPr>
+              <a:t>100 ש"ח</a:t>
+            </a:r>
+            <a:endParaRPr lang="en-US" sz="4400" b="1" cap="none" spc="0" dirty="0">
+              <a:ln/>
+              <a:solidFill>
+                <a:srgbClr val="09FF32"/>
+              </a:solidFill>
+              <a:effectLst>
+                <a:glow rad="1371600">
+                  <a:schemeClr val="bg1">
+                    <a:alpha val="78000"/>
+                  </a:schemeClr>
+                </a:glow>
+              </a:effectLst>
+            </a:endParaRPr>
+          </a:p>
+        </p:txBody>
+      </p:sp>
+      <p:sp>
+        <p:nvSpPr>
+          <p:cNvPr id="11" name="Rectangle 10">
+            <a:extLst>
+              <a:ext uri="{FF2B5EF4-FFF2-40B4-BE49-F238E27FC236}">
+                <a16:creationId xmlns:a16="http://schemas.microsoft.com/office/drawing/2014/main" id="{8E05FD48-5C3C-4E26-BD75-37111E4ADE7E}"/>
+              </a:ext>
+            </a:extLst>
+          </p:cNvPr>
+          <p:cNvSpPr/>
+          <p:nvPr/>
+        </p:nvSpPr>
+        <p:spPr>
+          <a:xfrm>
+            <a:off x="4076952" y="3006571"/>
+            <a:ext cx="4051109" cy="1815882"/>
+          </a:xfrm>
+          <a:prstGeom prst="rect">
+            <a:avLst/>
+          </a:prstGeom>
+          <a:noFill/>
+          <a:effectLst>
+            <a:glow rad="469900">
+              <a:schemeClr val="bg1">
+                <a:alpha val="47000"/>
+              </a:schemeClr>
+            </a:glow>
+          </a:effectLst>
+        </p:spPr>
+        <p:txBody>
+          <a:bodyPr wrap="none" lIns="91440" tIns="45720" rIns="91440" bIns="45720">
+            <a:spAutoFit/>
+          </a:bodyPr>
+          <a:lstStyle/>
+          <a:p>
+            <a:pPr algn="ctr" rtl="1"/>
+            <a:r>
+              <a:rPr lang="he-IL" sz="2800" b="1" dirty="0">
+                <a:ln w="9525">
+                  <a:solidFill>
+                    <a:schemeClr val="bg1"/>
+                  </a:solidFill>
+                  <a:prstDash val="solid"/>
+                </a:ln>
+                <a:solidFill>
+                  <a:schemeClr val="accent5"/>
+                </a:solidFill>
+                <a:effectLst>
+                  <a:outerShdw blurRad="12700" dist="38100" dir="2700000" algn="tl" rotWithShape="0">
+                    <a:schemeClr val="accent5">
+                      <a:lumMod val="60000"/>
+                      <a:lumOff val="40000"/>
+                    </a:schemeClr>
+                  </a:outerShdw>
+                </a:effectLst>
+              </a:rPr>
+              <a:t>המטלה הממוחשבת עורכת</a:t>
+            </a:r>
+            <a:endParaRPr lang="en-US" sz="2800" b="1" dirty="0">
+              <a:ln w="9525">
+                <a:solidFill>
+                  <a:schemeClr val="bg1"/>
+                </a:solidFill>
+                <a:prstDash val="solid"/>
+              </a:ln>
+              <a:solidFill>
+                <a:schemeClr val="accent5"/>
+              </a:solidFill>
+              <a:effectLst>
+                <a:outerShdw blurRad="12700" dist="38100" dir="2700000" algn="tl" rotWithShape="0">
+                  <a:schemeClr val="accent5">
+                    <a:lumMod val="60000"/>
+                    <a:lumOff val="40000"/>
+                  </a:schemeClr>
+                </a:outerShdw>
+              </a:effectLst>
+            </a:endParaRPr>
+          </a:p>
+          <a:p>
+            <a:pPr algn="ctr" rtl="1"/>
+            <a:endParaRPr lang="he-IL" sz="2800" b="1" cap="none" spc="0" dirty="0">
+              <a:ln w="9525">
+                <a:solidFill>
+                  <a:schemeClr val="bg1"/>
+                </a:solidFill>
+                <a:prstDash val="solid"/>
+              </a:ln>
+              <a:solidFill>
+                <a:schemeClr val="accent5"/>
+              </a:solidFill>
+              <a:effectLst>
+                <a:outerShdw blurRad="12700" dist="38100" dir="2700000" algn="tl" rotWithShape="0">
+                  <a:schemeClr val="accent5">
+                    <a:lumMod val="60000"/>
+                    <a:lumOff val="40000"/>
+                  </a:schemeClr>
+                </a:outerShdw>
+              </a:effectLst>
+            </a:endParaRPr>
+          </a:p>
+          <a:p>
+            <a:pPr algn="ctr" rtl="1"/>
+            <a:endParaRPr lang="en-US" sz="2800" b="1" cap="none" spc="0" dirty="0">
+              <a:ln w="9525">
+                <a:solidFill>
+                  <a:schemeClr val="bg1"/>
+                </a:solidFill>
+                <a:prstDash val="solid"/>
+              </a:ln>
+              <a:solidFill>
+                <a:schemeClr val="accent5"/>
+              </a:solidFill>
+              <a:effectLst>
+                <a:outerShdw blurRad="12700" dist="38100" dir="2700000" algn="tl" rotWithShape="0">
+                  <a:schemeClr val="accent5">
+                    <a:lumMod val="60000"/>
+                    <a:lumOff val="40000"/>
+                  </a:schemeClr>
+                </a:outerShdw>
+              </a:effectLst>
+            </a:endParaRPr>
+          </a:p>
+          <a:p>
+            <a:pPr algn="ctr" rtl="1"/>
+            <a:r>
+              <a:rPr lang="he-IL" sz="2800" b="1" dirty="0">
+                <a:ln w="9525">
+                  <a:solidFill>
+                    <a:schemeClr val="bg1"/>
+                  </a:solidFill>
+                  <a:prstDash val="solid"/>
+                </a:ln>
+                <a:solidFill>
+                  <a:schemeClr val="accent5"/>
+                </a:solidFill>
+                <a:effectLst>
+                  <a:outerShdw blurRad="12700" dist="38100" dir="2700000" algn="tl" rotWithShape="0">
+                    <a:schemeClr val="accent5">
+                      <a:lumMod val="60000"/>
+                      <a:lumOff val="40000"/>
+                    </a:schemeClr>
+                  </a:outerShdw>
+                </a:effectLst>
+              </a:rPr>
+              <a:t>עבורה תקבלו</a:t>
+            </a:r>
+            <a:endParaRPr lang="en-US" sz="2800" b="1" cap="none" spc="0" dirty="0">
+              <a:ln w="9525">
+                <a:solidFill>
+                  <a:schemeClr val="bg1"/>
+                </a:solidFill>
+                <a:prstDash val="solid"/>
+              </a:ln>
+              <a:solidFill>
+                <a:schemeClr val="accent5"/>
+              </a:solidFill>
+              <a:effectLst>
+                <a:outerShdw blurRad="12700" dist="38100" dir="2700000" algn="tl" rotWithShape="0">
+                  <a:schemeClr val="accent5">
+                    <a:lumMod val="60000"/>
+                    <a:lumOff val="40000"/>
+                  </a:schemeClr>
+                </a:outerShdw>
+              </a:effectLst>
+            </a:endParaRPr>
+          </a:p>
+        </p:txBody>
+      </p:sp>
+    </p:spTree>
+    <p:extLst>
+      <p:ext uri="{BB962C8B-B14F-4D97-AF65-F5344CB8AC3E}">
+        <p14:creationId xmlns:p14="http://schemas.microsoft.com/office/powerpoint/2010/main" val="263530768"/>
+      </p:ext>
+    </p:extLst>
+  </p:cSld>
+  <p:clrMapOvr>
+    <a:masterClrMapping/>
+  </p:clrMapOvr>
+</p:sld>
+</file>
+
 <file path=ppt/theme/theme1.xml><?xml version="1.0" encoding="utf-8"?>
 <a:theme xmlns:a="http://schemas.openxmlformats.org/drawingml/2006/main" name="Office Theme">
   <a:themeElements>

</xml_diff>